<commit_message>
aula 08 e arquivo requirements.txt
</commit_message>
<xml_diff>
--- a/aula-08/slides.pptx
+++ b/aula-08/slides.pptx
@@ -5,7 +5,7 @@
     <p:sldMasterId id="2147483659" r:id="rId1"/>
   </p:sldMasterIdLst>
   <p:notesMasterIdLst>
-    <p:notesMasterId r:id="rId46"/>
+    <p:notesMasterId r:id="rId45"/>
   </p:notesMasterIdLst>
   <p:sldIdLst>
     <p:sldId id="256" r:id="rId2"/>
@@ -43,15 +43,14 @@
     <p:sldId id="296" r:id="rId34"/>
     <p:sldId id="297" r:id="rId35"/>
     <p:sldId id="298" r:id="rId36"/>
-    <p:sldId id="299" r:id="rId37"/>
-    <p:sldId id="300" r:id="rId38"/>
-    <p:sldId id="301" r:id="rId39"/>
-    <p:sldId id="302" r:id="rId40"/>
-    <p:sldId id="303" r:id="rId41"/>
-    <p:sldId id="305" r:id="rId42"/>
-    <p:sldId id="307" r:id="rId43"/>
-    <p:sldId id="308" r:id="rId44"/>
-    <p:sldId id="309" r:id="rId45"/>
+    <p:sldId id="300" r:id="rId37"/>
+    <p:sldId id="301" r:id="rId38"/>
+    <p:sldId id="302" r:id="rId39"/>
+    <p:sldId id="303" r:id="rId40"/>
+    <p:sldId id="305" r:id="rId41"/>
+    <p:sldId id="307" r:id="rId42"/>
+    <p:sldId id="308" r:id="rId43"/>
+    <p:sldId id="309" r:id="rId44"/>
   </p:sldIdLst>
   <p:sldSz cx="9144000" cy="5715000" type="screen16x10"/>
   <p:notesSz cx="6858000" cy="9144000"/>
@@ -836,7 +835,11 @@
               </a:spcAft>
               <a:buNone/>
             </a:pPr>
-            <a:endParaRPr/>
+            <a:r>
+              <a:rPr lang="en-US" dirty="0"/>
+              <a:t>			</a:t>
+            </a:r>
+            <a:endParaRPr dirty="0"/>
           </a:p>
         </p:txBody>
       </p:sp>
@@ -3765,110 +3768,6 @@
   <p:cSld>
     <p:spTree>
       <p:nvGrpSpPr>
-        <p:cNvPr id="1" name="Shape 396"/>
-        <p:cNvGrpSpPr/>
-        <p:nvPr/>
-      </p:nvGrpSpPr>
-      <p:grpSpPr>
-        <a:xfrm>
-          <a:off x="0" y="0"/>
-          <a:ext cx="0" cy="0"/>
-          <a:chOff x="0" y="0"/>
-          <a:chExt cx="0" cy="0"/>
-        </a:xfrm>
-      </p:grpSpPr>
-      <p:sp>
-        <p:nvSpPr>
-          <p:cNvPr id="397" name="Google Shape;397;gb894a29cbc_0_110:notes"/>
-          <p:cNvSpPr>
-            <a:spLocks noGrp="1" noRot="1" noChangeAspect="1"/>
-          </p:cNvSpPr>
-          <p:nvPr>
-            <p:ph type="sldImg" idx="2"/>
-          </p:nvPr>
-        </p:nvSpPr>
-        <p:spPr>
-          <a:xfrm>
-            <a:off x="685800" y="685800"/>
-            <a:ext cx="5486400" cy="3429000"/>
-          </a:xfrm>
-          <a:custGeom>
-            <a:avLst/>
-            <a:gdLst/>
-            <a:ahLst/>
-            <a:cxnLst/>
-            <a:rect l="l" t="t" r="r" b="b"/>
-            <a:pathLst>
-              <a:path w="120000" h="120000" extrusionOk="0">
-                <a:moveTo>
-                  <a:pt x="0" y="0"/>
-                </a:moveTo>
-                <a:lnTo>
-                  <a:pt x="120000" y="0"/>
-                </a:lnTo>
-                <a:lnTo>
-                  <a:pt x="120000" y="120000"/>
-                </a:lnTo>
-                <a:lnTo>
-                  <a:pt x="0" y="120000"/>
-                </a:lnTo>
-                <a:close/>
-              </a:path>
-            </a:pathLst>
-          </a:custGeom>
-        </p:spPr>
-      </p:sp>
-      <p:sp>
-        <p:nvSpPr>
-          <p:cNvPr id="398" name="Google Shape;398;gb894a29cbc_0_110:notes"/>
-          <p:cNvSpPr txBox="1">
-            <a:spLocks noGrp="1"/>
-          </p:cNvSpPr>
-          <p:nvPr>
-            <p:ph type="body" idx="1"/>
-          </p:nvPr>
-        </p:nvSpPr>
-        <p:spPr>
-          <a:xfrm>
-            <a:off x="685800" y="4343400"/>
-            <a:ext cx="5486400" cy="4114800"/>
-          </a:xfrm>
-          <a:prstGeom prst="rect">
-            <a:avLst/>
-          </a:prstGeom>
-        </p:spPr>
-        <p:txBody>
-          <a:bodyPr spcFirstLastPara="1" wrap="square" lIns="91425" tIns="91425" rIns="91425" bIns="91425" anchor="t" anchorCtr="0">
-            <a:noAutofit/>
-          </a:bodyPr>
-          <a:lstStyle/>
-          <a:p>
-            <a:pPr marL="0" lvl="0" indent="0" algn="l" rtl="0">
-              <a:spcBef>
-                <a:spcPts val="0"/>
-              </a:spcBef>
-              <a:spcAft>
-                <a:spcPts val="0"/>
-              </a:spcAft>
-              <a:buNone/>
-            </a:pPr>
-            <a:endParaRPr/>
-          </a:p>
-        </p:txBody>
-      </p:sp>
-    </p:spTree>
-  </p:cSld>
-  <p:clrMapOvr>
-    <a:masterClrMapping/>
-  </p:clrMapOvr>
-</p:notes>
-</file>
-
-<file path=ppt/notesSlides/notesSlide37.xml><?xml version="1.0" encoding="utf-8"?>
-<p:notes xmlns:a="http://schemas.openxmlformats.org/drawingml/2006/main" xmlns:r="http://schemas.openxmlformats.org/officeDocument/2006/relationships" xmlns:p="http://schemas.openxmlformats.org/presentationml/2006/main" showMasterSp="0" showMasterPhAnim="0">
-  <p:cSld>
-    <p:spTree>
-      <p:nvGrpSpPr>
         <p:cNvPr id="1" name="Shape 403"/>
         <p:cNvGrpSpPr/>
         <p:nvPr/>
@@ -3968,7 +3867,7 @@
 </p:notes>
 </file>
 
-<file path=ppt/notesSlides/notesSlide38.xml><?xml version="1.0" encoding="utf-8"?>
+<file path=ppt/notesSlides/notesSlide37.xml><?xml version="1.0" encoding="utf-8"?>
 <p:notes xmlns:a="http://schemas.openxmlformats.org/drawingml/2006/main" xmlns:r="http://schemas.openxmlformats.org/officeDocument/2006/relationships" xmlns:p="http://schemas.openxmlformats.org/presentationml/2006/main" showMasterSp="0" showMasterPhAnim="0">
   <p:cSld>
     <p:spTree>
@@ -4072,7 +3971,7 @@
 </p:notes>
 </file>
 
-<file path=ppt/notesSlides/notesSlide39.xml><?xml version="1.0" encoding="utf-8"?>
+<file path=ppt/notesSlides/notesSlide38.xml><?xml version="1.0" encoding="utf-8"?>
 <p:notes xmlns:a="http://schemas.openxmlformats.org/drawingml/2006/main" xmlns:r="http://schemas.openxmlformats.org/officeDocument/2006/relationships" xmlns:p="http://schemas.openxmlformats.org/presentationml/2006/main" showMasterSp="0" showMasterPhAnim="0">
   <p:cSld>
     <p:spTree>
@@ -4133,6 +4032,110 @@
       <p:sp>
         <p:nvSpPr>
           <p:cNvPr id="421" name="Google Shape;421;gb885213714_0_296:notes"/>
+          <p:cNvSpPr txBox="1">
+            <a:spLocks noGrp="1"/>
+          </p:cNvSpPr>
+          <p:nvPr>
+            <p:ph type="body" idx="1"/>
+          </p:nvPr>
+        </p:nvSpPr>
+        <p:spPr>
+          <a:xfrm>
+            <a:off x="685800" y="4343400"/>
+            <a:ext cx="5486400" cy="4114800"/>
+          </a:xfrm>
+          <a:prstGeom prst="rect">
+            <a:avLst/>
+          </a:prstGeom>
+        </p:spPr>
+        <p:txBody>
+          <a:bodyPr spcFirstLastPara="1" wrap="square" lIns="91425" tIns="91425" rIns="91425" bIns="91425" anchor="t" anchorCtr="0">
+            <a:noAutofit/>
+          </a:bodyPr>
+          <a:lstStyle/>
+          <a:p>
+            <a:pPr marL="0" lvl="0" indent="0" algn="l" rtl="0">
+              <a:spcBef>
+                <a:spcPts val="0"/>
+              </a:spcBef>
+              <a:spcAft>
+                <a:spcPts val="0"/>
+              </a:spcAft>
+              <a:buNone/>
+            </a:pPr>
+            <a:endParaRPr/>
+          </a:p>
+        </p:txBody>
+      </p:sp>
+    </p:spTree>
+  </p:cSld>
+  <p:clrMapOvr>
+    <a:masterClrMapping/>
+  </p:clrMapOvr>
+</p:notes>
+</file>
+
+<file path=ppt/notesSlides/notesSlide39.xml><?xml version="1.0" encoding="utf-8"?>
+<p:notes xmlns:a="http://schemas.openxmlformats.org/drawingml/2006/main" xmlns:r="http://schemas.openxmlformats.org/officeDocument/2006/relationships" xmlns:p="http://schemas.openxmlformats.org/presentationml/2006/main" showMasterSp="0" showMasterPhAnim="0">
+  <p:cSld>
+    <p:spTree>
+      <p:nvGrpSpPr>
+        <p:cNvPr id="1" name="Shape 429"/>
+        <p:cNvGrpSpPr/>
+        <p:nvPr/>
+      </p:nvGrpSpPr>
+      <p:grpSpPr>
+        <a:xfrm>
+          <a:off x="0" y="0"/>
+          <a:ext cx="0" cy="0"/>
+          <a:chOff x="0" y="0"/>
+          <a:chExt cx="0" cy="0"/>
+        </a:xfrm>
+      </p:grpSpPr>
+      <p:sp>
+        <p:nvSpPr>
+          <p:cNvPr id="430" name="Google Shape;430;gb885213714_0_289:notes"/>
+          <p:cNvSpPr>
+            <a:spLocks noGrp="1" noRot="1" noChangeAspect="1"/>
+          </p:cNvSpPr>
+          <p:nvPr>
+            <p:ph type="sldImg" idx="2"/>
+          </p:nvPr>
+        </p:nvSpPr>
+        <p:spPr>
+          <a:xfrm>
+            <a:off x="685800" y="685800"/>
+            <a:ext cx="5486400" cy="3429000"/>
+          </a:xfrm>
+          <a:custGeom>
+            <a:avLst/>
+            <a:gdLst/>
+            <a:ahLst/>
+            <a:cxnLst/>
+            <a:rect l="l" t="t" r="r" b="b"/>
+            <a:pathLst>
+              <a:path w="120000" h="120000" extrusionOk="0">
+                <a:moveTo>
+                  <a:pt x="0" y="0"/>
+                </a:moveTo>
+                <a:lnTo>
+                  <a:pt x="120000" y="0"/>
+                </a:lnTo>
+                <a:lnTo>
+                  <a:pt x="120000" y="120000"/>
+                </a:lnTo>
+                <a:lnTo>
+                  <a:pt x="0" y="120000"/>
+                </a:lnTo>
+                <a:close/>
+              </a:path>
+            </a:pathLst>
+          </a:custGeom>
+        </p:spPr>
+      </p:sp>
+      <p:sp>
+        <p:nvSpPr>
+          <p:cNvPr id="431" name="Google Shape;431;gb885213714_0_289:notes"/>
           <p:cNvSpPr txBox="1">
             <a:spLocks noGrp="1"/>
           </p:cNvSpPr>
@@ -4285,110 +4288,6 @@
   <p:cSld>
     <p:spTree>
       <p:nvGrpSpPr>
-        <p:cNvPr id="1" name="Shape 429"/>
-        <p:cNvGrpSpPr/>
-        <p:nvPr/>
-      </p:nvGrpSpPr>
-      <p:grpSpPr>
-        <a:xfrm>
-          <a:off x="0" y="0"/>
-          <a:ext cx="0" cy="0"/>
-          <a:chOff x="0" y="0"/>
-          <a:chExt cx="0" cy="0"/>
-        </a:xfrm>
-      </p:grpSpPr>
-      <p:sp>
-        <p:nvSpPr>
-          <p:cNvPr id="430" name="Google Shape;430;gb885213714_0_289:notes"/>
-          <p:cNvSpPr>
-            <a:spLocks noGrp="1" noRot="1" noChangeAspect="1"/>
-          </p:cNvSpPr>
-          <p:nvPr>
-            <p:ph type="sldImg" idx="2"/>
-          </p:nvPr>
-        </p:nvSpPr>
-        <p:spPr>
-          <a:xfrm>
-            <a:off x="685800" y="685800"/>
-            <a:ext cx="5486400" cy="3429000"/>
-          </a:xfrm>
-          <a:custGeom>
-            <a:avLst/>
-            <a:gdLst/>
-            <a:ahLst/>
-            <a:cxnLst/>
-            <a:rect l="l" t="t" r="r" b="b"/>
-            <a:pathLst>
-              <a:path w="120000" h="120000" extrusionOk="0">
-                <a:moveTo>
-                  <a:pt x="0" y="0"/>
-                </a:moveTo>
-                <a:lnTo>
-                  <a:pt x="120000" y="0"/>
-                </a:lnTo>
-                <a:lnTo>
-                  <a:pt x="120000" y="120000"/>
-                </a:lnTo>
-                <a:lnTo>
-                  <a:pt x="0" y="120000"/>
-                </a:lnTo>
-                <a:close/>
-              </a:path>
-            </a:pathLst>
-          </a:custGeom>
-        </p:spPr>
-      </p:sp>
-      <p:sp>
-        <p:nvSpPr>
-          <p:cNvPr id="431" name="Google Shape;431;gb885213714_0_289:notes"/>
-          <p:cNvSpPr txBox="1">
-            <a:spLocks noGrp="1"/>
-          </p:cNvSpPr>
-          <p:nvPr>
-            <p:ph type="body" idx="1"/>
-          </p:nvPr>
-        </p:nvSpPr>
-        <p:spPr>
-          <a:xfrm>
-            <a:off x="685800" y="4343400"/>
-            <a:ext cx="5486400" cy="4114800"/>
-          </a:xfrm>
-          <a:prstGeom prst="rect">
-            <a:avLst/>
-          </a:prstGeom>
-        </p:spPr>
-        <p:txBody>
-          <a:bodyPr spcFirstLastPara="1" wrap="square" lIns="91425" tIns="91425" rIns="91425" bIns="91425" anchor="t" anchorCtr="0">
-            <a:noAutofit/>
-          </a:bodyPr>
-          <a:lstStyle/>
-          <a:p>
-            <a:pPr marL="0" lvl="0" indent="0" algn="l" rtl="0">
-              <a:spcBef>
-                <a:spcPts val="0"/>
-              </a:spcBef>
-              <a:spcAft>
-                <a:spcPts val="0"/>
-              </a:spcAft>
-              <a:buNone/>
-            </a:pPr>
-            <a:endParaRPr/>
-          </a:p>
-        </p:txBody>
-      </p:sp>
-    </p:spTree>
-  </p:cSld>
-  <p:clrMapOvr>
-    <a:masterClrMapping/>
-  </p:clrMapOvr>
-</p:notes>
-</file>
-
-<file path=ppt/notesSlides/notesSlide41.xml><?xml version="1.0" encoding="utf-8"?>
-<p:notes xmlns:a="http://schemas.openxmlformats.org/drawingml/2006/main" xmlns:r="http://schemas.openxmlformats.org/officeDocument/2006/relationships" xmlns:p="http://schemas.openxmlformats.org/presentationml/2006/main" showMasterSp="0" showMasterPhAnim="0">
-  <p:cSld>
-    <p:spTree>
-      <p:nvGrpSpPr>
         <p:cNvPr id="1" name="Shape 443"/>
         <p:cNvGrpSpPr/>
         <p:nvPr/>
@@ -4488,7 +4387,7 @@
 </p:notes>
 </file>
 
-<file path=ppt/notesSlides/notesSlide42.xml><?xml version="1.0" encoding="utf-8"?>
+<file path=ppt/notesSlides/notesSlide41.xml><?xml version="1.0" encoding="utf-8"?>
 <p:notes xmlns:a="http://schemas.openxmlformats.org/drawingml/2006/main" xmlns:r="http://schemas.openxmlformats.org/officeDocument/2006/relationships" xmlns:p="http://schemas.openxmlformats.org/presentationml/2006/main" showMasterSp="0" showMasterPhAnim="0">
   <p:cSld>
     <p:spTree>
@@ -4592,7 +4491,7 @@
 </p:notes>
 </file>
 
-<file path=ppt/notesSlides/notesSlide43.xml><?xml version="1.0" encoding="utf-8"?>
+<file path=ppt/notesSlides/notesSlide42.xml><?xml version="1.0" encoding="utf-8"?>
 <p:notes xmlns:a="http://schemas.openxmlformats.org/drawingml/2006/main" xmlns:r="http://schemas.openxmlformats.org/officeDocument/2006/relationships" xmlns:p="http://schemas.openxmlformats.org/presentationml/2006/main" showMasterSp="0" showMasterPhAnim="0">
   <p:cSld>
     <p:spTree>
@@ -4696,7 +4595,7 @@
 </p:notes>
 </file>
 
-<file path=ppt/notesSlides/notesSlide44.xml><?xml version="1.0" encoding="utf-8"?>
+<file path=ppt/notesSlides/notesSlide43.xml><?xml version="1.0" encoding="utf-8"?>
 <p:notes xmlns:a="http://schemas.openxmlformats.org/drawingml/2006/main" xmlns:r="http://schemas.openxmlformats.org/officeDocument/2006/relationships" xmlns:p="http://schemas.openxmlformats.org/presentationml/2006/main" showMasterSp="0" showMasterPhAnim="0">
   <p:cSld>
     <p:spTree>
@@ -19810,101 +19709,6 @@
   <p:cSld>
     <p:spTree>
       <p:nvGrpSpPr>
-        <p:cNvPr id="1" name="Shape 399"/>
-        <p:cNvGrpSpPr/>
-        <p:nvPr/>
-      </p:nvGrpSpPr>
-      <p:grpSpPr>
-        <a:xfrm>
-          <a:off x="0" y="0"/>
-          <a:ext cx="0" cy="0"/>
-          <a:chOff x="0" y="0"/>
-          <a:chExt cx="0" cy="0"/>
-        </a:xfrm>
-      </p:grpSpPr>
-      <p:sp>
-        <p:nvSpPr>
-          <p:cNvPr id="400" name="Google Shape;400;p56"/>
-          <p:cNvSpPr txBox="1">
-            <a:spLocks noGrp="1"/>
-          </p:cNvSpPr>
-          <p:nvPr>
-            <p:ph type="title"/>
-          </p:nvPr>
-        </p:nvSpPr>
-        <p:spPr>
-          <a:xfrm>
-            <a:off x="311700" y="494472"/>
-            <a:ext cx="8520600" cy="636300"/>
-          </a:xfrm>
-          <a:prstGeom prst="rect">
-            <a:avLst/>
-          </a:prstGeom>
-        </p:spPr>
-        <p:txBody>
-          <a:bodyPr spcFirstLastPara="1" wrap="square" lIns="91425" tIns="91425" rIns="91425" bIns="91425" anchor="t" anchorCtr="0">
-            <a:noAutofit/>
-          </a:bodyPr>
-          <a:lstStyle/>
-          <a:p>
-            <a:pPr marL="0" lvl="0" indent="0" algn="l" rtl="0">
-              <a:spcBef>
-                <a:spcPts val="0"/>
-              </a:spcBef>
-              <a:spcAft>
-                <a:spcPts val="0"/>
-              </a:spcAft>
-              <a:buNone/>
-            </a:pPr>
-            <a:r>
-              <a:rPr lang="en"/>
-              <a:t>Avaliação: Perplexidade</a:t>
-            </a:r>
-            <a:endParaRPr/>
-          </a:p>
-        </p:txBody>
-      </p:sp>
-      <p:pic>
-        <p:nvPicPr>
-          <p:cNvPr id="402" name="Google Shape;402;p56"/>
-          <p:cNvPicPr preferRelativeResize="0"/>
-          <p:nvPr/>
-        </p:nvPicPr>
-        <p:blipFill>
-          <a:blip r:embed="rId3">
-            <a:alphaModFix/>
-          </a:blip>
-          <a:stretch>
-            <a:fillRect/>
-          </a:stretch>
-        </p:blipFill>
-        <p:spPr>
-          <a:xfrm>
-            <a:off x="2179100" y="1350417"/>
-            <a:ext cx="4785803" cy="3820975"/>
-          </a:xfrm>
-          <a:prstGeom prst="rect">
-            <a:avLst/>
-          </a:prstGeom>
-          <a:noFill/>
-          <a:ln>
-            <a:noFill/>
-          </a:ln>
-        </p:spPr>
-      </p:pic>
-    </p:spTree>
-  </p:cSld>
-  <p:clrMapOvr>
-    <a:masterClrMapping/>
-  </p:clrMapOvr>
-</p:sld>
-</file>
-
-<file path=ppt/slides/slide37.xml><?xml version="1.0" encoding="utf-8"?>
-<p:sld xmlns:a="http://schemas.openxmlformats.org/drawingml/2006/main" xmlns:r="http://schemas.openxmlformats.org/officeDocument/2006/relationships" xmlns:p="http://schemas.openxmlformats.org/presentationml/2006/main">
-  <p:cSld>
-    <p:spTree>
-      <p:nvGrpSpPr>
         <p:cNvPr id="1" name="Shape 406"/>
         <p:cNvGrpSpPr/>
         <p:nvPr/>
@@ -20037,7 +19841,7 @@
 </p:sld>
 </file>
 
-<file path=ppt/slides/slide38.xml><?xml version="1.0" encoding="utf-8"?>
+<file path=ppt/slides/slide37.xml><?xml version="1.0" encoding="utf-8"?>
 <p:sld xmlns:a="http://schemas.openxmlformats.org/drawingml/2006/main" xmlns:r="http://schemas.openxmlformats.org/officeDocument/2006/relationships" xmlns:p="http://schemas.openxmlformats.org/presentationml/2006/main">
   <p:cSld>
     <p:spTree>
@@ -22607,7 +22411,7 @@
 </p:sld>
 </file>
 
-<file path=ppt/slides/slide39.xml><?xml version="1.0" encoding="utf-8"?>
+<file path=ppt/slides/slide38.xml><?xml version="1.0" encoding="utf-8"?>
 <p:sld xmlns:a="http://schemas.openxmlformats.org/drawingml/2006/main" xmlns:r="http://schemas.openxmlformats.org/officeDocument/2006/relationships" xmlns:p="http://schemas.openxmlformats.org/presentationml/2006/main">
   <p:cSld>
     <p:spTree>
@@ -22830,186 +22634,7 @@
 </p:sld>
 </file>
 
-<file path=ppt/slides/slide4.xml><?xml version="1.0" encoding="utf-8"?>
-<p:sld xmlns:a="http://schemas.openxmlformats.org/drawingml/2006/main" xmlns:r="http://schemas.openxmlformats.org/officeDocument/2006/relationships" xmlns:p="http://schemas.openxmlformats.org/presentationml/2006/main">
-  <p:cSld>
-    <p:spTree>
-      <p:nvGrpSpPr>
-        <p:cNvPr id="1" name="Shape 80"/>
-        <p:cNvGrpSpPr/>
-        <p:nvPr/>
-      </p:nvGrpSpPr>
-      <p:grpSpPr>
-        <a:xfrm>
-          <a:off x="0" y="0"/>
-          <a:ext cx="0" cy="0"/>
-          <a:chOff x="0" y="0"/>
-          <a:chExt cx="0" cy="0"/>
-        </a:xfrm>
-      </p:grpSpPr>
-      <p:sp>
-        <p:nvSpPr>
-          <p:cNvPr id="81" name="Google Shape;81;p16"/>
-          <p:cNvSpPr txBox="1">
-            <a:spLocks noGrp="1"/>
-          </p:cNvSpPr>
-          <p:nvPr>
-            <p:ph type="title"/>
-          </p:nvPr>
-        </p:nvSpPr>
-        <p:spPr>
-          <a:xfrm>
-            <a:off x="311700" y="494472"/>
-            <a:ext cx="8520600" cy="636300"/>
-          </a:xfrm>
-          <a:prstGeom prst="rect">
-            <a:avLst/>
-          </a:prstGeom>
-        </p:spPr>
-        <p:txBody>
-          <a:bodyPr spcFirstLastPara="1" wrap="square" lIns="91425" tIns="91425" rIns="91425" bIns="91425" anchor="t" anchorCtr="0">
-            <a:noAutofit/>
-          </a:bodyPr>
-          <a:lstStyle/>
-          <a:p>
-            <a:pPr marL="0" lvl="0" indent="0" algn="l" rtl="0">
-              <a:spcBef>
-                <a:spcPts val="0"/>
-              </a:spcBef>
-              <a:spcAft>
-                <a:spcPts val="0"/>
-              </a:spcAft>
-              <a:buNone/>
-            </a:pPr>
-            <a:endParaRPr/>
-          </a:p>
-        </p:txBody>
-      </p:sp>
-      <p:sp>
-        <p:nvSpPr>
-          <p:cNvPr id="82" name="Google Shape;82;p16"/>
-          <p:cNvSpPr txBox="1">
-            <a:spLocks noGrp="1"/>
-          </p:cNvSpPr>
-          <p:nvPr>
-            <p:ph type="body" idx="1"/>
-          </p:nvPr>
-        </p:nvSpPr>
-        <p:spPr>
-          <a:xfrm>
-            <a:off x="1072500" y="1556000"/>
-            <a:ext cx="6999000" cy="2603100"/>
-          </a:xfrm>
-          <a:prstGeom prst="rect">
-            <a:avLst/>
-          </a:prstGeom>
-        </p:spPr>
-        <p:txBody>
-          <a:bodyPr spcFirstLastPara="1" wrap="square" lIns="91425" tIns="91425" rIns="91425" bIns="91425" anchor="ctr" anchorCtr="0">
-            <a:noAutofit/>
-          </a:bodyPr>
-          <a:lstStyle/>
-          <a:p>
-            <a:pPr marL="0" lvl="0" indent="0" algn="ctr" rtl="0">
-              <a:spcBef>
-                <a:spcPts val="1000"/>
-              </a:spcBef>
-              <a:spcAft>
-                <a:spcPts val="0"/>
-              </a:spcAft>
-              <a:buNone/>
-            </a:pPr>
-            <a:r>
-              <a:rPr lang="en" sz="2000"/>
-              <a:t>Eu no supermercado de bicicleta vou.</a:t>
-            </a:r>
-            <a:endParaRPr sz="2000"/>
-          </a:p>
-          <a:p>
-            <a:pPr marL="0" lvl="0" indent="0" algn="ctr" rtl="0">
-              <a:spcBef>
-                <a:spcPts val="1600"/>
-              </a:spcBef>
-              <a:spcAft>
-                <a:spcPts val="0"/>
-              </a:spcAft>
-              <a:buNone/>
-            </a:pPr>
-            <a:r>
-              <a:rPr lang="en" sz="2000" b="1"/>
-              <a:t>vs.</a:t>
-            </a:r>
-            <a:endParaRPr sz="2000" b="1"/>
-          </a:p>
-          <a:p>
-            <a:pPr marL="0" lvl="0" indent="0" algn="ctr" rtl="0">
-              <a:spcBef>
-                <a:spcPts val="1600"/>
-              </a:spcBef>
-              <a:spcAft>
-                <a:spcPts val="1600"/>
-              </a:spcAft>
-              <a:buNone/>
-            </a:pPr>
-            <a:r>
-              <a:rPr lang="en" sz="2000"/>
-              <a:t>Eu vou de bicicleta no supermercado.</a:t>
-            </a:r>
-            <a:endParaRPr sz="2000" i="1"/>
-          </a:p>
-        </p:txBody>
-      </p:sp>
-      <p:sp>
-        <p:nvSpPr>
-          <p:cNvPr id="84" name="Google Shape;84;p16"/>
-          <p:cNvSpPr txBox="1">
-            <a:spLocks noGrp="1"/>
-          </p:cNvSpPr>
-          <p:nvPr>
-            <p:ph type="body" idx="1"/>
-          </p:nvPr>
-        </p:nvSpPr>
-        <p:spPr>
-          <a:xfrm>
-            <a:off x="1207275" y="4782056"/>
-            <a:ext cx="6999000" cy="450000"/>
-          </a:xfrm>
-          <a:prstGeom prst="rect">
-            <a:avLst/>
-          </a:prstGeom>
-        </p:spPr>
-        <p:txBody>
-          <a:bodyPr spcFirstLastPara="1" wrap="square" lIns="91425" tIns="91425" rIns="91425" bIns="91425" anchor="ctr" anchorCtr="0">
-            <a:noAutofit/>
-          </a:bodyPr>
-          <a:lstStyle/>
-          <a:p>
-            <a:pPr marL="0" lvl="0" indent="0" algn="ctr" rtl="0">
-              <a:spcBef>
-                <a:spcPts val="1000"/>
-              </a:spcBef>
-              <a:spcAft>
-                <a:spcPts val="1600"/>
-              </a:spcAft>
-              <a:buNone/>
-            </a:pPr>
-            <a:r>
-              <a:rPr lang="en" sz="2000" i="1"/>
-              <a:t>Qual a sentença mais provável?</a:t>
-            </a:r>
-            <a:endParaRPr sz="2000" i="1"/>
-          </a:p>
-        </p:txBody>
-      </p:sp>
-    </p:spTree>
-  </p:cSld>
-  <p:clrMapOvr>
-    <a:masterClrMapping/>
-  </p:clrMapOvr>
-</p:sld>
-</file>
-
-<file path=ppt/slides/slide40.xml><?xml version="1.0" encoding="utf-8"?>
+<file path=ppt/slides/slide39.xml><?xml version="1.0" encoding="utf-8"?>
 <p:sld xmlns:a="http://schemas.openxmlformats.org/drawingml/2006/main" xmlns:r="http://schemas.openxmlformats.org/officeDocument/2006/relationships" xmlns:p="http://schemas.openxmlformats.org/presentationml/2006/main">
   <p:cSld>
     <p:spTree>
@@ -25598,7 +25223,186 @@
 </p:sld>
 </file>
 
-<file path=ppt/slides/slide41.xml><?xml version="1.0" encoding="utf-8"?>
+<file path=ppt/slides/slide4.xml><?xml version="1.0" encoding="utf-8"?>
+<p:sld xmlns:a="http://schemas.openxmlformats.org/drawingml/2006/main" xmlns:r="http://schemas.openxmlformats.org/officeDocument/2006/relationships" xmlns:p="http://schemas.openxmlformats.org/presentationml/2006/main">
+  <p:cSld>
+    <p:spTree>
+      <p:nvGrpSpPr>
+        <p:cNvPr id="1" name="Shape 80"/>
+        <p:cNvGrpSpPr/>
+        <p:nvPr/>
+      </p:nvGrpSpPr>
+      <p:grpSpPr>
+        <a:xfrm>
+          <a:off x="0" y="0"/>
+          <a:ext cx="0" cy="0"/>
+          <a:chOff x="0" y="0"/>
+          <a:chExt cx="0" cy="0"/>
+        </a:xfrm>
+      </p:grpSpPr>
+      <p:sp>
+        <p:nvSpPr>
+          <p:cNvPr id="81" name="Google Shape;81;p16"/>
+          <p:cNvSpPr txBox="1">
+            <a:spLocks noGrp="1"/>
+          </p:cNvSpPr>
+          <p:nvPr>
+            <p:ph type="title"/>
+          </p:nvPr>
+        </p:nvSpPr>
+        <p:spPr>
+          <a:xfrm>
+            <a:off x="311700" y="494472"/>
+            <a:ext cx="8520600" cy="636300"/>
+          </a:xfrm>
+          <a:prstGeom prst="rect">
+            <a:avLst/>
+          </a:prstGeom>
+        </p:spPr>
+        <p:txBody>
+          <a:bodyPr spcFirstLastPara="1" wrap="square" lIns="91425" tIns="91425" rIns="91425" bIns="91425" anchor="t" anchorCtr="0">
+            <a:noAutofit/>
+          </a:bodyPr>
+          <a:lstStyle/>
+          <a:p>
+            <a:pPr marL="0" lvl="0" indent="0" algn="l" rtl="0">
+              <a:spcBef>
+                <a:spcPts val="0"/>
+              </a:spcBef>
+              <a:spcAft>
+                <a:spcPts val="0"/>
+              </a:spcAft>
+              <a:buNone/>
+            </a:pPr>
+            <a:endParaRPr/>
+          </a:p>
+        </p:txBody>
+      </p:sp>
+      <p:sp>
+        <p:nvSpPr>
+          <p:cNvPr id="82" name="Google Shape;82;p16"/>
+          <p:cNvSpPr txBox="1">
+            <a:spLocks noGrp="1"/>
+          </p:cNvSpPr>
+          <p:nvPr>
+            <p:ph type="body" idx="1"/>
+          </p:nvPr>
+        </p:nvSpPr>
+        <p:spPr>
+          <a:xfrm>
+            <a:off x="1072500" y="1556000"/>
+            <a:ext cx="6999000" cy="2603100"/>
+          </a:xfrm>
+          <a:prstGeom prst="rect">
+            <a:avLst/>
+          </a:prstGeom>
+        </p:spPr>
+        <p:txBody>
+          <a:bodyPr spcFirstLastPara="1" wrap="square" lIns="91425" tIns="91425" rIns="91425" bIns="91425" anchor="ctr" anchorCtr="0">
+            <a:noAutofit/>
+          </a:bodyPr>
+          <a:lstStyle/>
+          <a:p>
+            <a:pPr marL="0" lvl="0" indent="0" algn="ctr" rtl="0">
+              <a:spcBef>
+                <a:spcPts val="1000"/>
+              </a:spcBef>
+              <a:spcAft>
+                <a:spcPts val="0"/>
+              </a:spcAft>
+              <a:buNone/>
+            </a:pPr>
+            <a:r>
+              <a:rPr lang="en" sz="2000"/>
+              <a:t>Eu no supermercado de bicicleta vou.</a:t>
+            </a:r>
+            <a:endParaRPr sz="2000"/>
+          </a:p>
+          <a:p>
+            <a:pPr marL="0" lvl="0" indent="0" algn="ctr" rtl="0">
+              <a:spcBef>
+                <a:spcPts val="1600"/>
+              </a:spcBef>
+              <a:spcAft>
+                <a:spcPts val="0"/>
+              </a:spcAft>
+              <a:buNone/>
+            </a:pPr>
+            <a:r>
+              <a:rPr lang="en" sz="2000" b="1"/>
+              <a:t>vs.</a:t>
+            </a:r>
+            <a:endParaRPr sz="2000" b="1"/>
+          </a:p>
+          <a:p>
+            <a:pPr marL="0" lvl="0" indent="0" algn="ctr" rtl="0">
+              <a:spcBef>
+                <a:spcPts val="1600"/>
+              </a:spcBef>
+              <a:spcAft>
+                <a:spcPts val="1600"/>
+              </a:spcAft>
+              <a:buNone/>
+            </a:pPr>
+            <a:r>
+              <a:rPr lang="en" sz="2000"/>
+              <a:t>Eu vou de bicicleta no supermercado.</a:t>
+            </a:r>
+            <a:endParaRPr sz="2000" i="1"/>
+          </a:p>
+        </p:txBody>
+      </p:sp>
+      <p:sp>
+        <p:nvSpPr>
+          <p:cNvPr id="84" name="Google Shape;84;p16"/>
+          <p:cNvSpPr txBox="1">
+            <a:spLocks noGrp="1"/>
+          </p:cNvSpPr>
+          <p:nvPr>
+            <p:ph type="body" idx="1"/>
+          </p:nvPr>
+        </p:nvSpPr>
+        <p:spPr>
+          <a:xfrm>
+            <a:off x="1207275" y="4782056"/>
+            <a:ext cx="6999000" cy="450000"/>
+          </a:xfrm>
+          <a:prstGeom prst="rect">
+            <a:avLst/>
+          </a:prstGeom>
+        </p:spPr>
+        <p:txBody>
+          <a:bodyPr spcFirstLastPara="1" wrap="square" lIns="91425" tIns="91425" rIns="91425" bIns="91425" anchor="ctr" anchorCtr="0">
+            <a:noAutofit/>
+          </a:bodyPr>
+          <a:lstStyle/>
+          <a:p>
+            <a:pPr marL="0" lvl="0" indent="0" algn="ctr" rtl="0">
+              <a:spcBef>
+                <a:spcPts val="1000"/>
+              </a:spcBef>
+              <a:spcAft>
+                <a:spcPts val="1600"/>
+              </a:spcAft>
+              <a:buNone/>
+            </a:pPr>
+            <a:r>
+              <a:rPr lang="en" sz="2000" i="1"/>
+              <a:t>Qual a sentença mais provável?</a:t>
+            </a:r>
+            <a:endParaRPr sz="2000" i="1"/>
+          </a:p>
+        </p:txBody>
+      </p:sp>
+    </p:spTree>
+  </p:cSld>
+  <p:clrMapOvr>
+    <a:masterClrMapping/>
+  </p:clrMapOvr>
+</p:sld>
+</file>
+
+<file path=ppt/slides/slide40.xml><?xml version="1.0" encoding="utf-8"?>
 <p:sld xmlns:a="http://schemas.openxmlformats.org/drawingml/2006/main" xmlns:r="http://schemas.openxmlformats.org/officeDocument/2006/relationships" xmlns:p="http://schemas.openxmlformats.org/presentationml/2006/main">
   <p:cSld>
     <p:spTree>
@@ -25863,7 +25667,7 @@
 </p:sld>
 </file>
 
-<file path=ppt/slides/slide42.xml><?xml version="1.0" encoding="utf-8"?>
+<file path=ppt/slides/slide41.xml><?xml version="1.0" encoding="utf-8"?>
 <p:sld xmlns:a="http://schemas.openxmlformats.org/drawingml/2006/main" xmlns:r="http://schemas.openxmlformats.org/officeDocument/2006/relationships" xmlns:p="http://schemas.openxmlformats.org/presentationml/2006/main">
   <p:cSld>
     <p:spTree>
@@ -26186,7 +25990,7 @@
 </p:sld>
 </file>
 
-<file path=ppt/slides/slide43.xml><?xml version="1.0" encoding="utf-8"?>
+<file path=ppt/slides/slide42.xml><?xml version="1.0" encoding="utf-8"?>
 <p:sld xmlns:a="http://schemas.openxmlformats.org/drawingml/2006/main" xmlns:r="http://schemas.openxmlformats.org/officeDocument/2006/relationships" xmlns:p="http://schemas.openxmlformats.org/presentationml/2006/main">
   <p:cSld>
     <p:spTree>
@@ -26388,7 +26192,7 @@
 </p:sld>
 </file>
 
-<file path=ppt/slides/slide44.xml><?xml version="1.0" encoding="utf-8"?>
+<file path=ppt/slides/slide43.xml><?xml version="1.0" encoding="utf-8"?>
 <p:sld xmlns:a="http://schemas.openxmlformats.org/drawingml/2006/main" xmlns:r="http://schemas.openxmlformats.org/officeDocument/2006/relationships" xmlns:p="http://schemas.openxmlformats.org/presentationml/2006/main">
   <p:cSld>
     <p:spTree>

</xml_diff>